<commit_message>
minor change to ppt
</commit_message>
<xml_diff>
--- a/pp_slides_for_part_1/Exploring the Yelp Dataset.pptx
+++ b/pp_slides_for_part_1/Exploring the Yelp Dataset.pptx
@@ -110,6 +110,11 @@
       </a:defRPr>
     </a:lvl9pPr>
   </p:defaultTextStyle>
+  <p:extLst>
+    <p:ext uri="{EFAFB233-063F-42B5-8137-9DF3F51BA10A}">
+      <p15:sldGuideLst xmlns:p15="http://schemas.microsoft.com/office/powerpoint/2012/main"/>
+    </p:ext>
+  </p:extLst>
 </p:presentation>
 </file>
 
@@ -260,7 +265,7 @@
           <a:p>
             <a:fld id="{EBD81C53-0597-4E72-BB79-BE1CB78F10E3}" type="datetimeFigureOut">
               <a:rPr lang="en-US" smtClean="0"/>
-              <a:t>10/11/2019</a:t>
+              <a:t>10/11/19</a:t>
             </a:fld>
             <a:endParaRPr lang="en-US"/>
           </a:p>
@@ -458,7 +463,7 @@
           <a:p>
             <a:fld id="{EBD81C53-0597-4E72-BB79-BE1CB78F10E3}" type="datetimeFigureOut">
               <a:rPr lang="en-US" smtClean="0"/>
-              <a:t>10/11/2019</a:t>
+              <a:t>10/11/19</a:t>
             </a:fld>
             <a:endParaRPr lang="en-US"/>
           </a:p>
@@ -666,7 +671,7 @@
           <a:p>
             <a:fld id="{EBD81C53-0597-4E72-BB79-BE1CB78F10E3}" type="datetimeFigureOut">
               <a:rPr lang="en-US" smtClean="0"/>
-              <a:t>10/11/2019</a:t>
+              <a:t>10/11/19</a:t>
             </a:fld>
             <a:endParaRPr lang="en-US"/>
           </a:p>
@@ -864,7 +869,7 @@
           <a:p>
             <a:fld id="{EBD81C53-0597-4E72-BB79-BE1CB78F10E3}" type="datetimeFigureOut">
               <a:rPr lang="en-US" smtClean="0"/>
-              <a:t>10/11/2019</a:t>
+              <a:t>10/11/19</a:t>
             </a:fld>
             <a:endParaRPr lang="en-US"/>
           </a:p>
@@ -1139,7 +1144,7 @@
           <a:p>
             <a:fld id="{EBD81C53-0597-4E72-BB79-BE1CB78F10E3}" type="datetimeFigureOut">
               <a:rPr lang="en-US" smtClean="0"/>
-              <a:t>10/11/2019</a:t>
+              <a:t>10/11/19</a:t>
             </a:fld>
             <a:endParaRPr lang="en-US"/>
           </a:p>
@@ -1404,7 +1409,7 @@
           <a:p>
             <a:fld id="{EBD81C53-0597-4E72-BB79-BE1CB78F10E3}" type="datetimeFigureOut">
               <a:rPr lang="en-US" smtClean="0"/>
-              <a:t>10/11/2019</a:t>
+              <a:t>10/11/19</a:t>
             </a:fld>
             <a:endParaRPr lang="en-US"/>
           </a:p>
@@ -1816,7 +1821,7 @@
           <a:p>
             <a:fld id="{EBD81C53-0597-4E72-BB79-BE1CB78F10E3}" type="datetimeFigureOut">
               <a:rPr lang="en-US" smtClean="0"/>
-              <a:t>10/11/2019</a:t>
+              <a:t>10/11/19</a:t>
             </a:fld>
             <a:endParaRPr lang="en-US"/>
           </a:p>
@@ -1957,7 +1962,7 @@
           <a:p>
             <a:fld id="{EBD81C53-0597-4E72-BB79-BE1CB78F10E3}" type="datetimeFigureOut">
               <a:rPr lang="en-US" smtClean="0"/>
-              <a:t>10/11/2019</a:t>
+              <a:t>10/11/19</a:t>
             </a:fld>
             <a:endParaRPr lang="en-US"/>
           </a:p>
@@ -2070,7 +2075,7 @@
           <a:p>
             <a:fld id="{EBD81C53-0597-4E72-BB79-BE1CB78F10E3}" type="datetimeFigureOut">
               <a:rPr lang="en-US" smtClean="0"/>
-              <a:t>10/11/2019</a:t>
+              <a:t>10/11/19</a:t>
             </a:fld>
             <a:endParaRPr lang="en-US"/>
           </a:p>
@@ -2381,7 +2386,7 @@
           <a:p>
             <a:fld id="{EBD81C53-0597-4E72-BB79-BE1CB78F10E3}" type="datetimeFigureOut">
               <a:rPr lang="en-US" smtClean="0"/>
-              <a:t>10/11/2019</a:t>
+              <a:t>10/11/19</a:t>
             </a:fld>
             <a:endParaRPr lang="en-US"/>
           </a:p>
@@ -2669,7 +2674,7 @@
           <a:p>
             <a:fld id="{EBD81C53-0597-4E72-BB79-BE1CB78F10E3}" type="datetimeFigureOut">
               <a:rPr lang="en-US" smtClean="0"/>
-              <a:t>10/11/2019</a:t>
+              <a:t>10/11/19</a:t>
             </a:fld>
             <a:endParaRPr lang="en-US"/>
           </a:p>
@@ -2910,7 +2915,7 @@
           <a:p>
             <a:fld id="{EBD81C53-0597-4E72-BB79-BE1CB78F10E3}" type="datetimeFigureOut">
               <a:rPr lang="en-US" smtClean="0"/>
-              <a:t>10/11/2019</a:t>
+              <a:t>10/11/19</a:t>
             </a:fld>
             <a:endParaRPr lang="en-US"/>
           </a:p>
@@ -4706,7 +4711,9 @@
           </a:xfrm>
         </p:spPr>
         <p:txBody>
-          <a:bodyPr/>
+          <a:bodyPr>
+            <a:normAutofit fontScale="92500" lnSpcReduction="10000"/>
+          </a:bodyPr>
           <a:lstStyle/>
           <a:p>
             <a:r>
@@ -4735,7 +4742,7 @@
                   <a:schemeClr val="bg1"/>
                 </a:solidFill>
               </a:rPr>
-              <a:t>We also have date attributes, which may allow us to predict rating based on time of year</a:t>
+              <a:t>We also have date attributes, which may allow us to predict rating based on time of year.</a:t>
             </a:r>
           </a:p>
           <a:p>
@@ -4746,6 +4753,16 @@
                 </a:solidFill>
               </a:rPr>
               <a:t>Open ended exploration. We intend to look at many different relationships in this dataset. </a:t>
+            </a:r>
+          </a:p>
+          <a:p>
+            <a:r>
+              <a:rPr lang="en-US" dirty="0">
+                <a:solidFill>
+                  <a:schemeClr val="bg1"/>
+                </a:solidFill>
+              </a:rPr>
+              <a:t>We might combine external variables such as weather data or health of the economy to view correlations with review volume or sentiment.</a:t>
             </a:r>
           </a:p>
         </p:txBody>

</xml_diff>